<commit_message>
Update SWOT Matrix and Zone to Win risk analysis
</commit_message>
<xml_diff>
--- a/generated_docs/BCG_Slide_Deck.pptx
+++ b/generated_docs/BCG_Slide_Deck.pptx
@@ -13,6 +13,7 @@
     <p:sldId id="261" r:id="rId12"/>
     <p:sldId id="262" r:id="rId13"/>
     <p:sldId id="263" r:id="rId14"/>
+    <p:sldId id="264" r:id="rId15"/>
   </p:sldIdLst>
   <p:sldSz cx="9144000" cy="6858000" type="screen4x3"/>
   <p:notesSz cx="6858000" cy="9144000"/>
@@ -3132,7 +3133,7 @@
           <a:lstStyle/>
           <a:p>
             <a:r>
-              <a:t>Department Portfolio Analysis</a:t>
+              <a:t>Department &amp; Major-Level Portfolio Analysis</a:t>
             </a:r>
           </a:p>
           <a:p>
@@ -3197,31 +3198,31 @@
           <a:lstStyle/>
           <a:p>
             <a:r>
-              <a:t>The BCG Growth-Share Matrix, adapted from the Boston Consulting Group framework, categorizes FLC's academic departments based on two dimensions: relative market share (measured by percentage of total Student Credit Hours) and growth rate (2-year enrollment change). Programs are classified as Stars, Cash Cows, Question Marks, or Concerns to guide resource allocation priorities.</a:t>
+              <a:t>The BCG Growth-Share Matrix, adapted from the Boston Consulting Group framework, analyzes FLC's academic portfolio at two levels. The department-level view maps 22 departments by SCH share (% of total Student Credit Hours) vs. 2-year enrollment change, identifying which departments generate institutional revenue. The major-level view maps 48 individual majors by 2024 enrollment headcount vs. 2022–2024 percentage change, with bubble size representing absolute enrollment change. Programs with fewer than 20 students in 2022 are flagged as ‘small base’ since their percentage changes can be misleading.</a:t>
             </a:r>
           </a:p>
           <a:p>
             <a:pPr/>
             <a:r>
-              <a:t>X-axis: % of Total SCH (23-24) = Market Share</a:t>
+              <a:t>Department view: X = % of Total SCH, Y = 2-Year Change % (22 departments)</a:t>
             </a:r>
           </a:p>
           <a:p>
             <a:pPr/>
             <a:r>
-              <a:t>Y-axis: 2-Year Change % = Growth Rate</a:t>
+              <a:t>Major view: X = 2024 Enrollment, Y = % Change 2022–2024 (48 majors)</a:t>
             </a:r>
           </a:p>
           <a:p>
             <a:pPr/>
             <a:r>
-              <a:t>Note: 'Concerns' used instead of 'Dogs' per FLC preference</a:t>
+              <a:t>Bubble size (major view): Absolute enrollment change (students gained/lost)</a:t>
             </a:r>
           </a:p>
           <a:p>
             <a:pPr/>
             <a:r>
-              <a:t>Source: BCG Presentation.pptx, BCG-growthMatrixDepts.png</a:t>
+              <a:t>Small-base flag: Programs with &lt; 20 students in 2022</a:t>
             </a:r>
           </a:p>
         </p:txBody>
@@ -3260,7 +3261,7 @@
           <a:lstStyle/>
           <a:p>
             <a:r>
-              <a:t>Stars</a:t>
+              <a:t>Department-Level BCG (SCH-Based)</a:t>
             </a:r>
           </a:p>
         </p:txBody>
@@ -3281,19 +3282,37 @@
           <a:lstStyle/>
           <a:p>
             <a:r>
-              <a:t>2 departments in this quadrant</a:t>
+              <a:t>Stars: 2 departments (Business Admin, Psychology)</a:t>
             </a:r>
           </a:p>
           <a:p>
             <a:pPr/>
             <a:r>
-              <a:t>Business Administration: 5.8% SCH, +4.0%</a:t>
+              <a:t>Cash Cows: 9 departments (English, Math, Biology, HHP, Sociology, etc.)</a:t>
             </a:r>
           </a:p>
           <a:p>
             <a:pPr/>
             <a:r>
-              <a:t>Psychology: 6.0% SCH, +3.0%</a:t>
+              <a:t>Question Marks: 2 departments (Accounting, History)</a:t>
+            </a:r>
+          </a:p>
+          <a:p>
+            <a:pPr/>
+            <a:r>
+              <a:t>Concerns: 9 departments (Political Science, Economics, Art &amp; Design, etc.)</a:t>
+            </a:r>
+          </a:p>
+          <a:p>
+            <a:pPr/>
+            <a:r>
+              <a:t>Cash Cows generate bulk of institutional SCH but all show 2-year declines</a:t>
+            </a:r>
+          </a:p>
+          <a:p>
+            <a:pPr/>
+            <a:r>
+              <a:t>Source: BCG Presentation.pptx (FLC Internal)</a:t>
             </a:r>
           </a:p>
         </p:txBody>
@@ -3332,7 +3351,7 @@
           <a:lstStyle/>
           <a:p>
             <a:r>
-              <a:t>Cash Cows</a:t>
+              <a:t>Stars — Large &amp; Growing</a:t>
             </a:r>
           </a:p>
         </p:txBody>
@@ -3353,43 +3372,43 @@
           <a:lstStyle/>
           <a:p>
             <a:r>
-              <a:t>9 departments in this quadrant</a:t>
+              <a:t>15 majors in this quadrant</a:t>
             </a:r>
           </a:p>
           <a:p>
             <a:pPr/>
             <a:r>
-              <a:t>English: 10.0% SCH, -6.0%</a:t>
+              <a:t>Business Administration: 325 enrolled, +10.2% (+30)</a:t>
             </a:r>
           </a:p>
           <a:p>
             <a:pPr/>
             <a:r>
-              <a:t>Mathematics: 8.5% SCH, -11.0%</a:t>
+              <a:t>Engineering: 204 enrolled, +4.1% (+8)</a:t>
             </a:r>
           </a:p>
           <a:p>
             <a:pPr/>
             <a:r>
-              <a:t>Health &amp; Human Performance: 7.5% SCH, -3.0%</a:t>
+              <a:t>Exercise Physiology: 160 enrolled, +16.8% (+23)</a:t>
             </a:r>
           </a:p>
           <a:p>
             <a:pPr/>
             <a:r>
-              <a:t>Biology: 7.0% SCH, -14.5%</a:t>
+              <a:t>Environmental Conservation and Management: 133 enrolled, +62.2% (+51)</a:t>
             </a:r>
           </a:p>
           <a:p>
             <a:pPr/>
             <a:r>
-              <a:t>Sociology: 6.0% SCH, -5.5%</a:t>
+              <a:t>Criminology &amp; Justice Studies: 103 enrolled, +2.0% (+2)</a:t>
             </a:r>
           </a:p>
           <a:p>
             <a:pPr/>
             <a:r>
-              <a:t>Performing Arts: 5.5% SCH, -3.0%</a:t>
+              <a:t>Health Sciences: 86 enrolled, +68.6% (+35)</a:t>
             </a:r>
           </a:p>
         </p:txBody>
@@ -3428,7 +3447,7 @@
           <a:lstStyle/>
           <a:p>
             <a:r>
-              <a:t>Question Marks</a:t>
+              <a:t>Cash Cows — Large &amp; Declining</a:t>
             </a:r>
           </a:p>
         </p:txBody>
@@ -3449,19 +3468,43 @@
           <a:lstStyle/>
           <a:p>
             <a:r>
-              <a:t>2 departments in this quadrant</a:t>
+              <a:t>9 majors in this quadrant</a:t>
             </a:r>
           </a:p>
           <a:p>
             <a:pPr/>
             <a:r>
-              <a:t>Accounting: 1.8% SCH, +12.0%</a:t>
+              <a:t>Psychology: 224 enrolled, -17.6% (-48)</a:t>
             </a:r>
           </a:p>
           <a:p>
             <a:pPr/>
             <a:r>
-              <a:t>History: 3.8% SCH, +3.0%</a:t>
+              <a:t>Biology/Cellular &amp; Molecular Biology: 111 enrolled, -42.5% (-82)</a:t>
+            </a:r>
+          </a:p>
+          <a:p>
+            <a:pPr/>
+            <a:r>
+              <a:t>Pre-Major Accounting: 102 enrolled, -31.5% (-47)</a:t>
+            </a:r>
+          </a:p>
+          <a:p>
+            <a:pPr/>
+            <a:r>
+              <a:t>Environmental Science: 86 enrolled, -14.0% (-14)</a:t>
+            </a:r>
+          </a:p>
+          <a:p>
+            <a:pPr/>
+            <a:r>
+              <a:t>Sociology and Human Services: 65 enrolled, +0.0% (+0)</a:t>
+            </a:r>
+          </a:p>
+          <a:p>
+            <a:pPr/>
+            <a:r>
+              <a:t>Accounting: 60 enrolled, -4.8% (-3)</a:t>
             </a:r>
           </a:p>
         </p:txBody>
@@ -3500,7 +3543,7 @@
           <a:lstStyle/>
           <a:p>
             <a:r>
-              <a:t>Concerns</a:t>
+              <a:t>Question Marks — Small &amp; Growing</a:t>
             </a:r>
           </a:p>
         </p:txBody>
@@ -3521,43 +3564,43 @@
           <a:lstStyle/>
           <a:p>
             <a:r>
-              <a:t>9 departments in this quadrant</a:t>
+              <a:t>7 majors in this quadrant</a:t>
             </a:r>
           </a:p>
           <a:p>
             <a:pPr/>
             <a:r>
-              <a:t>Geosciences: 4.2% SCH, -15.5%</a:t>
+              <a:t>Music: 27 enrolled, +125.0% (+15) *</a:t>
             </a:r>
           </a:p>
           <a:p>
             <a:pPr/>
             <a:r>
-              <a:t>Art &amp; Design: 2.5% SCH, -18.0%</a:t>
+              <a:t>English: 26 enrolled, +23.8% (+5)</a:t>
             </a:r>
           </a:p>
           <a:p>
             <a:pPr/>
             <a:r>
-              <a:t>Economics: 2.5% SCH, -24.0%</a:t>
+              <a:t>Nutrition: 23 enrolled, +15.0% (+3)</a:t>
             </a:r>
           </a:p>
           <a:p>
             <a:pPr/>
             <a:r>
-              <a:t>Political Science: 1.5% SCH, -26.0%</a:t>
+              <a:t>Mathematics: 21 enrolled, +31.2% (+5) *</a:t>
             </a:r>
           </a:p>
           <a:p>
             <a:pPr/>
             <a:r>
-              <a:t>Anthropology: 2.5% SCH, -7.5%</a:t>
+              <a:t>Elementary Education: 21 enrolled, +16.7% (+3) *</a:t>
             </a:r>
           </a:p>
           <a:p>
             <a:pPr/>
             <a:r>
-              <a:t>Environment &amp; Sustainability: 3.0% SCH, -8.0%</a:t>
+              <a:t>Early Childhood Education: 10 enrolled, +42.9% (+3) *</a:t>
             </a:r>
           </a:p>
         </p:txBody>
@@ -3596,7 +3639,7 @@
           <a:lstStyle/>
           <a:p>
             <a:r>
-              <a:t>Portfolio Health</a:t>
+              <a:t>Concerns — Small &amp; Declining</a:t>
             </a:r>
           </a:p>
         </p:txBody>
@@ -3617,25 +3660,43 @@
           <a:lstStyle/>
           <a:p>
             <a:r>
-              <a:t>2 Stars (9%), 9 Cash Cows (41%), 2 Question Marks (9%), 9 Concerns (41%)</a:t>
+              <a:t>17 majors in this quadrant</a:t>
             </a:r>
           </a:p>
           <a:p>
             <a:pPr/>
             <a:r>
-              <a:t>Concerning imbalance: 41% of departments in Concern quadrant</a:t>
+              <a:t>History: 37 enrolled, +0.0% (+0)</a:t>
             </a:r>
           </a:p>
           <a:p>
             <a:pPr/>
             <a:r>
-              <a:t>Cash Cows provide stable SCH but face declining trajectories</a:t>
+              <a:t>Public Health: 37 enrolled, -57.0% (-49)</a:t>
             </a:r>
           </a:p>
           <a:p>
             <a:pPr/>
             <a:r>
-              <a:t>Mission-critical Concern programs need restructuring, not elimination</a:t>
+              <a:t>Journalism &amp; Multimedia Studies: 34 enrolled, -24.4% (-11)</a:t>
+            </a:r>
+          </a:p>
+          <a:p>
+            <a:pPr/>
+            <a:r>
+              <a:t>Political Science: 31 enrolled, -13.9% (-5)</a:t>
+            </a:r>
+          </a:p>
+          <a:p>
+            <a:pPr/>
+            <a:r>
+              <a:t>Exercise &amp; Health Promotion: 27 enrolled, -22.9% (-8)</a:t>
+            </a:r>
+          </a:p>
+          <a:p>
+            <a:pPr/>
+            <a:r>
+              <a:t>Chemistry: 27 enrolled, +0.0% (+0)</a:t>
             </a:r>
           </a:p>
         </p:txBody>
@@ -3674,6 +3735,84 @@
           <a:lstStyle/>
           <a:p>
             <a:r>
+              <a:t>Portfolio Health</a:t>
+            </a:r>
+          </a:p>
+        </p:txBody>
+      </p:sp>
+      <p:sp>
+        <p:nvSpPr>
+          <p:cNvPr id="3" name="Content Placeholder 2"/>
+          <p:cNvSpPr>
+            <a:spLocks noGrp="1"/>
+          </p:cNvSpPr>
+          <p:nvPr>
+            <p:ph idx="1"/>
+          </p:nvPr>
+        </p:nvSpPr>
+        <p:spPr/>
+        <p:txBody>
+          <a:bodyPr/>
+          <a:lstStyle/>
+          <a:p>
+            <a:r>
+              <a:t>15 Stars, 9 Cash Cows, 7 Question Marks, 17 Concerns</a:t>
+            </a:r>
+          </a:p>
+          <a:p>
+            <a:pPr/>
+            <a:r>
+              <a:t>Overall enrollment declined 3.1% (2,899 → 2,810) from 2022 to 2024</a:t>
+            </a:r>
+          </a:p>
+          <a:p>
+            <a:pPr/>
+            <a:r>
+              <a:t>12 programs flagged as small base (&lt; 20 students in 2022)</a:t>
+            </a:r>
+          </a:p>
+          <a:p>
+            <a:pPr/>
+            <a:r>
+              <a:t>Mission-critical programs (e.g., NAIS) must not be evaluated on enrollment alone</a:t>
+            </a:r>
+          </a:p>
+        </p:txBody>
+      </p:sp>
+    </p:spTree>
+  </p:cSld>
+  <p:clrMapOvr>
+    <a:masterClrMapping/>
+  </p:clrMapOvr>
+</p:sld>
+</file>
+
+<file path=ppt/slides/slide9.xml><?xml version="1.0" encoding="utf-8"?>
+<p:sld xmlns:a="http://schemas.openxmlformats.org/drawingml/2006/main" xmlns:p="http://schemas.openxmlformats.org/presentationml/2006/main" xmlns:r="http://schemas.openxmlformats.org/officeDocument/2006/relationships">
+  <p:cSld>
+    <p:spTree>
+      <p:nvGrpSpPr>
+        <p:cNvPr id="1" name=""/>
+        <p:cNvGrpSpPr/>
+        <p:nvPr/>
+      </p:nvGrpSpPr>
+      <p:grpSpPr/>
+      <p:sp>
+        <p:nvSpPr>
+          <p:cNvPr id="2" name="Title 1"/>
+          <p:cNvSpPr>
+            <a:spLocks noGrp="1"/>
+          </p:cNvSpPr>
+          <p:nvPr>
+            <p:ph type="title"/>
+          </p:nvPr>
+        </p:nvSpPr>
+        <p:spPr/>
+        <p:txBody>
+          <a:bodyPr/>
+          <a:lstStyle/>
+          <a:p>
+            <a:r>
               <a:t>Investment Recommendations</a:t>
             </a:r>
           </a:p>
@@ -3695,31 +3834,31 @@
           <a:lstStyle/>
           <a:p>
             <a:r>
-              <a:t>Stars: Invest to accelerate (online, graduate tracks)</a:t>
+              <a:t>Stars: Invest to sustain — Business Admin, Exercise Physiology, Env Conservation lead</a:t>
             </a:r>
           </a:p>
           <a:p>
             <a:pPr/>
             <a:r>
-              <a:t>Cash Cows: Optimize efficiency, protect SCH generation</a:t>
+              <a:t>Cash Cows: Optimize efficiency — Psychology, Biology/CMB need retention focus</a:t>
             </a:r>
           </a:p>
           <a:p>
             <a:pPr/>
             <a:r>
-              <a:t>Question Marks: Evaluate selectively (Accounting promising)</a:t>
+              <a:t>Question Marks: Validate growth sustainability before major investment</a:t>
             </a:r>
           </a:p>
           <a:p>
             <a:pPr/>
             <a:r>
-              <a:t>Concerns: Structured review; differentiate mission-critical vs. phase-out</a:t>
+              <a:t>Concerns: Structured review; protect mission-critical programs</a:t>
             </a:r>
           </a:p>
           <a:p>
             <a:pPr/>
             <a:r>
-              <a:t>Explore interdisciplinary combinations for Concern programs</a:t>
+              <a:t>Small-base caution: Interpret percentage changes for tiny programs with care</a:t>
             </a:r>
           </a:p>
         </p:txBody>

</xml_diff>